<commit_message>
Minor updates to Covid_Infection_Deaths and Covid_Mask_Usage notebooks. Updated Mask_Usage_Income notebook to include sources and an explanations of code.
</commit_message>
<xml_diff>
--- a/Behavioral_Economic_Factors_and_COVID-19.pptx
+++ b/Behavioral_Economic_Factors_and_COVID-19.pptx
@@ -6411,6 +6411,55 @@
           <a:chExt cx="0" cy="0"/>
         </a:xfrm>
       </p:grpSpPr>
+      <p:sp useBgFill="1">
+        <p:nvSpPr>
+          <p:cNvPr id="9" name="Rectangle 8">
+            <a:extLst>
+              <a:ext uri="{FF2B5EF4-FFF2-40B4-BE49-F238E27FC236}">
+                <a16:creationId xmlns:a16="http://schemas.microsoft.com/office/drawing/2014/main" id="{6BD7B5BF-1ABE-4A88-BECB-05E879D7E061}"/>
+              </a:ext>
+            </a:extLst>
+          </p:cNvPr>
+          <p:cNvSpPr/>
+          <p:nvPr/>
+        </p:nvSpPr>
+        <p:spPr>
+          <a:xfrm>
+            <a:off x="679076" y="699247"/>
+            <a:ext cx="7335371" cy="3092824"/>
+          </a:xfrm>
+          <a:prstGeom prst="rect">
+            <a:avLst/>
+          </a:prstGeom>
+          <a:ln>
+            <a:noFill/>
+          </a:ln>
+        </p:spPr>
+        <p:style>
+          <a:lnRef idx="2">
+            <a:schemeClr val="accent1">
+              <a:shade val="50000"/>
+            </a:schemeClr>
+          </a:lnRef>
+          <a:fillRef idx="1">
+            <a:schemeClr val="accent1"/>
+          </a:fillRef>
+          <a:effectRef idx="0">
+            <a:schemeClr val="accent1"/>
+          </a:effectRef>
+          <a:fontRef idx="minor">
+            <a:schemeClr val="lt1"/>
+          </a:fontRef>
+        </p:style>
+        <p:txBody>
+          <a:bodyPr rtlCol="0" anchor="ctr"/>
+          <a:lstStyle/>
+          <a:p>
+            <a:pPr algn="ctr"/>
+            <a:endParaRPr lang="en-US"/>
+          </a:p>
+        </p:txBody>
+      </p:sp>
       <p:sp>
         <p:nvSpPr>
           <p:cNvPr id="195" name="Google Shape;195;p19"/>

</xml_diff>

<commit_message>
Changed deaths to mortalities in powerpoint. Updated boxplot to show mortalities.  Updated notebook name to mortalities as well.
</commit_message>
<xml_diff>
--- a/Behavioral_Economic_Factors_and_COVID-19.pptx
+++ b/Behavioral_Economic_Factors_and_COVID-19.pptx
@@ -37,13 +37,6 @@
       <p:font typeface="Encode Sans Semi Condensed Light" panose="020B0604020202020204" charset="0"/>
       <p:regular r:id="rId21"/>
       <p:bold r:id="rId22"/>
-    </p:embeddedFont>
-    <p:embeddedFont>
-      <p:font typeface="Segoe UI" panose="020B0502040204020203" pitchFamily="34" charset="0"/>
-      <p:regular r:id="rId23"/>
-      <p:bold r:id="rId24"/>
-      <p:italic r:id="rId25"/>
-      <p:boldItalic r:id="rId26"/>
     </p:embeddedFont>
   </p:embeddedFontLst>
   <p:defaultTextStyle>
@@ -7724,7 +7717,7 @@
           <a:p>
             <a:r>
               <a:rPr lang="en-US" sz="1600" dirty="0"/>
-              <a:t>Although we found that COVID-19 infections and COVID-19 deaths to be strongly related and predictive, economic factors such as healthcare costs and uninsured rates were linked to COVID-19 infections, but not to mortality.</a:t>
+              <a:t>Although we found that COVID-19 infections and COVID-19 mortality to be strongly related and predictive, economic factors such as healthcare costs and uninsured rates were linked to COVID-19 infections, but not to mortality.</a:t>
             </a:r>
           </a:p>
           <a:p>
@@ -8093,7 +8086,7 @@
           <a:p>
             <a:r>
               <a:rPr lang="en-US" sz="1200" dirty="0"/>
-              <a:t>Our team wanted to tell the story of COVID-19 in the United States and the effects of mask use, income and healthcare cost on infections and deaths. </a:t>
+              <a:t>Our team wanted to tell the story of COVID-19 in the United States and the effects of mask use, income and healthcare cost on infections and mortalities. </a:t>
             </a:r>
           </a:p>
           <a:p>
@@ -8106,7 +8099,7 @@
             <a:pPr lvl="1"/>
             <a:r>
               <a:rPr lang="en-US" sz="1200" dirty="0"/>
-              <a:t>How strong is the relationship between COVID19 infections and deaths?</a:t>
+              <a:t>How strong is the relationship between COVID19 infections and mortalities?</a:t>
             </a:r>
           </a:p>
           <a:p>
@@ -8406,8 +8399,8 @@
         </p:nvSpPr>
         <p:spPr>
           <a:xfrm>
-            <a:off x="514800" y="2025550"/>
-            <a:ext cx="8114400" cy="655800"/>
+            <a:off x="514799" y="2025550"/>
+            <a:ext cx="8306471" cy="655800"/>
           </a:xfrm>
           <a:prstGeom prst="rect">
             <a:avLst/>
@@ -8434,7 +8427,7 @@
             </a:r>
             <a:r>
               <a:rPr lang="en" dirty="0"/>
-              <a:t> Infections and Deaths</a:t>
+              <a:t> Infections and Mortalities</a:t>
             </a:r>
             <a:endParaRPr dirty="0"/>
           </a:p>
@@ -8530,7 +8523,7 @@
             </a:r>
             <a:r>
               <a:rPr lang="en" dirty="0"/>
-              <a:t> Infections and Deaths</a:t>
+              <a:t> Infections and Mortalities</a:t>
             </a:r>
             <a:endParaRPr lang="en-US" dirty="0"/>
           </a:p>
@@ -8604,36 +8597,6 @@
           </a:prstGeom>
         </p:spPr>
       </p:pic>
-      <p:pic>
-        <p:nvPicPr>
-          <p:cNvPr id="27" name="Picture 26" descr="A screenshot of a video game&#10;&#10;Description automatically generated">
-            <a:extLst>
-              <a:ext uri="{FF2B5EF4-FFF2-40B4-BE49-F238E27FC236}">
-                <a16:creationId xmlns:a16="http://schemas.microsoft.com/office/drawing/2014/main" id="{BCA952F2-1DF1-414D-A3E4-44B59209AC06}"/>
-              </a:ext>
-            </a:extLst>
-          </p:cNvPr>
-          <p:cNvPicPr>
-            <a:picLocks noChangeAspect="1"/>
-          </p:cNvPicPr>
-          <p:nvPr/>
-        </p:nvPicPr>
-        <p:blipFill>
-          <a:blip r:embed="rId3"/>
-          <a:stretch>
-            <a:fillRect/>
-          </a:stretch>
-        </p:blipFill>
-        <p:spPr>
-          <a:xfrm>
-            <a:off x="4388776" y="789449"/>
-            <a:ext cx="2743825" cy="2743825"/>
-          </a:xfrm>
-          <a:prstGeom prst="rect">
-            <a:avLst/>
-          </a:prstGeom>
-        </p:spPr>
-      </p:pic>
       <p:graphicFrame>
         <p:nvGraphicFramePr>
           <p:cNvPr id="10" name="Table 9">
@@ -8649,14 +8612,14 @@
           <p:nvPr>
             <p:extLst>
               <p:ext uri="{D42A27DB-BD31-4B8C-83A1-F6EECF244321}">
-                <p14:modId xmlns:p14="http://schemas.microsoft.com/office/powerpoint/2010/main" val="1157298467"/>
+                <p14:modId xmlns:p14="http://schemas.microsoft.com/office/powerpoint/2010/main" val="188316651"/>
               </p:ext>
             </p:extLst>
           </p:nvPr>
         </p:nvGraphicFramePr>
         <p:xfrm>
-          <a:off x="2928633" y="3031373"/>
-          <a:ext cx="1546134" cy="1642278"/>
+          <a:off x="2912534" y="2571750"/>
+          <a:ext cx="1546134" cy="2042075"/>
         </p:xfrm>
         <a:graphic>
           <a:graphicData uri="http://schemas.openxmlformats.org/drawingml/2006/table">
@@ -8680,6 +8643,148 @@
                   </a:extLst>
                 </a:gridCol>
               </a:tblGrid>
+              <a:tr h="399797">
+                <a:tc gridSpan="2">
+                  <a:txBody>
+                    <a:bodyPr/>
+                    <a:lstStyle/>
+                    <a:p>
+                      <a:pPr algn="ctr" fontAlgn="ctr"/>
+                      <a:r>
+                        <a:rPr lang="en-US" sz="1200" b="1" i="0" u="none" strike="noStrike" dirty="0">
+                          <a:solidFill>
+                            <a:schemeClr val="bg1"/>
+                          </a:solidFill>
+                          <a:effectLst/>
+                          <a:latin typeface="Arial" panose="020B0604020202020204" pitchFamily="34" charset="0"/>
+                          <a:cs typeface="Arial" panose="020B0604020202020204" pitchFamily="34" charset="0"/>
+                        </a:rPr>
+                        <a:t>Outliers</a:t>
+                      </a:r>
+                    </a:p>
+                  </a:txBody>
+                  <a:tcPr marL="9525" marR="9525" marT="9525" marB="0" anchor="ctr">
+                    <a:lnL w="12700" cap="flat" cmpd="sng" algn="ctr">
+                      <a:solidFill>
+                        <a:schemeClr val="bg1"/>
+                      </a:solidFill>
+                      <a:prstDash val="solid"/>
+                      <a:round/>
+                      <a:headEnd type="none" w="med" len="med"/>
+                      <a:tailEnd type="none" w="med" len="med"/>
+                    </a:lnL>
+                    <a:lnR w="12700" cap="flat" cmpd="sng" algn="ctr">
+                      <a:solidFill>
+                        <a:schemeClr val="bg1"/>
+                      </a:solidFill>
+                      <a:prstDash val="solid"/>
+                      <a:round/>
+                      <a:headEnd type="none" w="med" len="med"/>
+                      <a:tailEnd type="none" w="med" len="med"/>
+                    </a:lnR>
+                    <a:lnT w="12700" cap="flat" cmpd="sng" algn="ctr">
+                      <a:solidFill>
+                        <a:schemeClr val="bg1"/>
+                      </a:solidFill>
+                      <a:prstDash val="solid"/>
+                      <a:round/>
+                      <a:headEnd type="none" w="med" len="med"/>
+                      <a:tailEnd type="none" w="med" len="med"/>
+                    </a:lnT>
+                    <a:lnB w="12700" cap="flat" cmpd="sng" algn="ctr">
+                      <a:solidFill>
+                        <a:schemeClr val="bg1"/>
+                      </a:solidFill>
+                      <a:prstDash val="solid"/>
+                      <a:round/>
+                      <a:headEnd type="none" w="med" len="med"/>
+                      <a:tailEnd type="none" w="med" len="med"/>
+                    </a:lnB>
+                    <a:lnTlToBr w="12700" cmpd="sng">
+                      <a:noFill/>
+                      <a:prstDash val="solid"/>
+                    </a:lnTlToBr>
+                    <a:lnBlToTr w="12700" cmpd="sng">
+                      <a:noFill/>
+                      <a:prstDash val="solid"/>
+                    </a:lnBlToTr>
+                    <a:solidFill>
+                      <a:schemeClr val="accent1"/>
+                    </a:solidFill>
+                  </a:tcPr>
+                </a:tc>
+                <a:tc hMerge="1">
+                  <a:txBody>
+                    <a:bodyPr/>
+                    <a:lstStyle/>
+                    <a:p>
+                      <a:pPr algn="ctr" fontAlgn="ctr"/>
+                      <a:endParaRPr lang="en-US" sz="1000" b="1" i="0" u="none" strike="noStrike" dirty="0">
+                        <a:solidFill>
+                          <a:schemeClr val="bg1"/>
+                        </a:solidFill>
+                        <a:effectLst/>
+                        <a:latin typeface="Arial" panose="020B0604020202020204" pitchFamily="34" charset="0"/>
+                        <a:cs typeface="Arial" panose="020B0604020202020204" pitchFamily="34" charset="0"/>
+                      </a:endParaRPr>
+                    </a:p>
+                  </a:txBody>
+                  <a:tcPr marL="9525" marR="9525" marT="9525" marB="0" anchor="ctr">
+                    <a:lnL w="12700" cap="flat" cmpd="sng" algn="ctr">
+                      <a:solidFill>
+                        <a:schemeClr val="bg1"/>
+                      </a:solidFill>
+                      <a:prstDash val="solid"/>
+                      <a:round/>
+                      <a:headEnd type="none" w="med" len="med"/>
+                      <a:tailEnd type="none" w="med" len="med"/>
+                    </a:lnL>
+                    <a:lnR w="12700" cap="flat" cmpd="sng" algn="ctr">
+                      <a:solidFill>
+                        <a:schemeClr val="bg1"/>
+                      </a:solidFill>
+                      <a:prstDash val="solid"/>
+                      <a:round/>
+                      <a:headEnd type="none" w="med" len="med"/>
+                      <a:tailEnd type="none" w="med" len="med"/>
+                    </a:lnR>
+                    <a:lnT w="12700" cap="flat" cmpd="sng" algn="ctr">
+                      <a:solidFill>
+                        <a:schemeClr val="bg1"/>
+                      </a:solidFill>
+                      <a:prstDash val="solid"/>
+                      <a:round/>
+                      <a:headEnd type="none" w="med" len="med"/>
+                      <a:tailEnd type="none" w="med" len="med"/>
+                    </a:lnT>
+                    <a:lnB w="12700" cap="flat" cmpd="sng" algn="ctr">
+                      <a:solidFill>
+                        <a:schemeClr val="bg1"/>
+                      </a:solidFill>
+                      <a:prstDash val="solid"/>
+                      <a:round/>
+                      <a:headEnd type="none" w="med" len="med"/>
+                      <a:tailEnd type="none" w="med" len="med"/>
+                    </a:lnB>
+                    <a:lnTlToBr w="12700" cmpd="sng">
+                      <a:noFill/>
+                      <a:prstDash val="solid"/>
+                    </a:lnTlToBr>
+                    <a:lnBlToTr w="12700" cmpd="sng">
+                      <a:noFill/>
+                      <a:prstDash val="solid"/>
+                    </a:lnBlToTr>
+                    <a:solidFill>
+                      <a:schemeClr val="accent1"/>
+                    </a:solidFill>
+                  </a:tcPr>
+                </a:tc>
+                <a:extLst>
+                  <a:ext uri="{0D108BD9-81ED-4DB2-BD59-A6C34878D82A}">
+                    <a16:rowId xmlns:a16="http://schemas.microsoft.com/office/drawing/2014/main" val="2922824200"/>
+                  </a:ext>
+                </a:extLst>
+              </a:tr>
               <a:tr h="708874">
                 <a:tc>
                   <a:txBody>
@@ -9424,14 +9529,14 @@
           <p:nvPr>
             <p:extLst>
               <p:ext uri="{D42A27DB-BD31-4B8C-83A1-F6EECF244321}">
-                <p14:modId xmlns:p14="http://schemas.microsoft.com/office/powerpoint/2010/main" val="4099841667"/>
+                <p14:modId xmlns:p14="http://schemas.microsoft.com/office/powerpoint/2010/main" val="19131446"/>
               </p:ext>
             </p:extLst>
           </p:nvPr>
         </p:nvGraphicFramePr>
         <p:xfrm>
-          <a:off x="7132601" y="2982138"/>
-          <a:ext cx="1546133" cy="1888313"/>
+          <a:off x="7246907" y="2579231"/>
+          <a:ext cx="1546133" cy="2294834"/>
         </p:xfrm>
         <a:graphic>
           <a:graphicData uri="http://schemas.openxmlformats.org/drawingml/2006/table">
@@ -9455,6 +9560,131 @@
                   </a:extLst>
                 </a:gridCol>
               </a:tblGrid>
+              <a:tr h="406521">
+                <a:tc gridSpan="2">
+                  <a:txBody>
+                    <a:bodyPr/>
+                    <a:lstStyle/>
+                    <a:p>
+                      <a:pPr algn="ctr" fontAlgn="ctr"/>
+                      <a:r>
+                        <a:rPr lang="en-US" sz="1200" b="1" i="0" u="none" strike="noStrike" dirty="0">
+                          <a:solidFill>
+                            <a:schemeClr val="bg1"/>
+                          </a:solidFill>
+                          <a:effectLst/>
+                          <a:latin typeface="Arial" panose="020B0604020202020204" pitchFamily="34" charset="0"/>
+                          <a:cs typeface="Arial" panose="020B0604020202020204" pitchFamily="34" charset="0"/>
+                        </a:rPr>
+                        <a:t>Outliers</a:t>
+                      </a:r>
+                    </a:p>
+                  </a:txBody>
+                  <a:tcPr marL="9525" marR="9525" marT="9525" marB="0" anchor="ctr">
+                    <a:lnL w="12700" cap="flat" cmpd="sng" algn="ctr">
+                      <a:solidFill>
+                        <a:schemeClr val="bg1"/>
+                      </a:solidFill>
+                      <a:prstDash val="solid"/>
+                      <a:round/>
+                      <a:headEnd type="none" w="med" len="med"/>
+                      <a:tailEnd type="none" w="med" len="med"/>
+                    </a:lnL>
+                    <a:lnR w="12700" cap="flat" cmpd="sng" algn="ctr">
+                      <a:solidFill>
+                        <a:schemeClr val="bg1"/>
+                      </a:solidFill>
+                      <a:prstDash val="solid"/>
+                      <a:round/>
+                      <a:headEnd type="none" w="med" len="med"/>
+                      <a:tailEnd type="none" w="med" len="med"/>
+                    </a:lnR>
+                    <a:lnT w="12700" cap="flat" cmpd="sng" algn="ctr">
+                      <a:solidFill>
+                        <a:schemeClr val="bg1"/>
+                      </a:solidFill>
+                      <a:prstDash val="solid"/>
+                      <a:round/>
+                      <a:headEnd type="none" w="med" len="med"/>
+                      <a:tailEnd type="none" w="med" len="med"/>
+                    </a:lnT>
+                    <a:lnB w="12700" cap="flat" cmpd="sng" algn="ctr">
+                      <a:solidFill>
+                        <a:schemeClr val="bg1"/>
+                      </a:solidFill>
+                      <a:prstDash val="solid"/>
+                      <a:round/>
+                      <a:headEnd type="none" w="med" len="med"/>
+                      <a:tailEnd type="none" w="med" len="med"/>
+                    </a:lnB>
+                    <a:solidFill>
+                      <a:schemeClr val="accent1"/>
+                    </a:solidFill>
+                  </a:tcPr>
+                </a:tc>
+                <a:tc hMerge="1">
+                  <a:txBody>
+                    <a:bodyPr/>
+                    <a:lstStyle/>
+                    <a:p>
+                      <a:pPr algn="ctr" fontAlgn="ctr"/>
+                      <a:endParaRPr lang="en-US" sz="1000" b="1" i="0" u="none" strike="noStrike" dirty="0">
+                        <a:solidFill>
+                          <a:schemeClr val="bg1"/>
+                        </a:solidFill>
+                        <a:effectLst/>
+                        <a:latin typeface="Segoe UI" panose="020B0502040204020203" pitchFamily="34" charset="0"/>
+                      </a:endParaRPr>
+                    </a:p>
+                  </a:txBody>
+                  <a:tcPr marL="9525" marR="9525" marT="9525" marB="0" anchor="ctr">
+                    <a:lnL w="12700" cap="flat" cmpd="sng" algn="ctr">
+                      <a:solidFill>
+                        <a:schemeClr val="bg1"/>
+                      </a:solidFill>
+                      <a:prstDash val="solid"/>
+                      <a:round/>
+                      <a:headEnd type="none" w="med" len="med"/>
+                      <a:tailEnd type="none" w="med" len="med"/>
+                    </a:lnL>
+                    <a:lnR w="12700" cap="flat" cmpd="sng" algn="ctr">
+                      <a:solidFill>
+                        <a:schemeClr val="bg1"/>
+                      </a:solidFill>
+                      <a:prstDash val="solid"/>
+                      <a:round/>
+                      <a:headEnd type="none" w="med" len="med"/>
+                      <a:tailEnd type="none" w="med" len="med"/>
+                    </a:lnR>
+                    <a:lnT w="12700" cap="flat" cmpd="sng" algn="ctr">
+                      <a:solidFill>
+                        <a:schemeClr val="bg1"/>
+                      </a:solidFill>
+                      <a:prstDash val="solid"/>
+                      <a:round/>
+                      <a:headEnd type="none" w="med" len="med"/>
+                      <a:tailEnd type="none" w="med" len="med"/>
+                    </a:lnT>
+                    <a:lnB w="12700" cap="flat" cmpd="sng" algn="ctr">
+                      <a:solidFill>
+                        <a:schemeClr val="bg1"/>
+                      </a:solidFill>
+                      <a:prstDash val="solid"/>
+                      <a:round/>
+                      <a:headEnd type="none" w="med" len="med"/>
+                      <a:tailEnd type="none" w="med" len="med"/>
+                    </a:lnB>
+                    <a:solidFill>
+                      <a:schemeClr val="accent1"/>
+                    </a:solidFill>
+                  </a:tcPr>
+                </a:tc>
+                <a:extLst>
+                  <a:ext uri="{0D108BD9-81ED-4DB2-BD59-A6C34878D82A}">
+                    <a16:rowId xmlns:a16="http://schemas.microsoft.com/office/drawing/2014/main" val="556903842"/>
+                  </a:ext>
+                </a:extLst>
+              </a:tr>
               <a:tr h="736903">
                 <a:tc>
                   <a:txBody>
@@ -9468,6 +9698,8 @@
                             <a:schemeClr val="bg1"/>
                           </a:solidFill>
                           <a:effectLst/>
+                          <a:latin typeface="Arial" panose="020B0604020202020204" pitchFamily="34" charset="0"/>
+                          <a:cs typeface="Arial" panose="020B0604020202020204" pitchFamily="34" charset="0"/>
                         </a:rPr>
                         <a:t>States</a:t>
                       </a:r>
@@ -9476,7 +9708,8 @@
                           <a:schemeClr val="bg1"/>
                         </a:solidFill>
                         <a:effectLst/>
-                        <a:latin typeface="Segoe UI" panose="020B0502040204020203" pitchFamily="34" charset="0"/>
+                        <a:latin typeface="Arial" panose="020B0604020202020204" pitchFamily="34" charset="0"/>
+                        <a:cs typeface="Arial" panose="020B0604020202020204" pitchFamily="34" charset="0"/>
                       </a:endParaRPr>
                     </a:p>
                   </a:txBody>
@@ -9534,6 +9767,8 @@
                             <a:schemeClr val="bg1"/>
                           </a:solidFill>
                           <a:effectLst/>
+                          <a:latin typeface="Arial" panose="020B0604020202020204" pitchFamily="34" charset="0"/>
+                          <a:cs typeface="Arial" panose="020B0604020202020204" pitchFamily="34" charset="0"/>
                         </a:rPr>
                         <a:t>COVID-19</a:t>
                       </a:r>
@@ -9541,21 +9776,16 @@
                     <a:p>
                       <a:pPr algn="ctr" fontAlgn="ctr"/>
                       <a:r>
-                        <a:rPr lang="en-US" sz="1000" b="1" u="none" strike="noStrike" dirty="0">
+                        <a:rPr lang="en-US" sz="1000" b="1" i="0" u="none" strike="noStrike" dirty="0">
                           <a:solidFill>
                             <a:schemeClr val="bg1"/>
                           </a:solidFill>
                           <a:effectLst/>
+                          <a:latin typeface="Arial" panose="020B0604020202020204" pitchFamily="34" charset="0"/>
+                          <a:cs typeface="Arial" panose="020B0604020202020204" pitchFamily="34" charset="0"/>
                         </a:rPr>
-                        <a:t>Deaths</a:t>
+                        <a:t>Mortalities</a:t>
                       </a:r>
-                      <a:endParaRPr lang="en-US" sz="1000" b="1" i="0" u="none" strike="noStrike" dirty="0">
-                        <a:solidFill>
-                          <a:schemeClr val="bg1"/>
-                        </a:solidFill>
-                        <a:effectLst/>
-                        <a:latin typeface="Segoe UI" panose="020B0502040204020203" pitchFamily="34" charset="0"/>
-                      </a:endParaRPr>
                     </a:p>
                   </a:txBody>
                   <a:tcPr marL="9525" marR="9525" marT="9525" marB="0" anchor="ctr">
@@ -9619,6 +9849,8 @@
                             <a:schemeClr val="bg1"/>
                           </a:solidFill>
                           <a:effectLst/>
+                          <a:latin typeface="Arial" panose="020B0604020202020204" pitchFamily="34" charset="0"/>
+                          <a:cs typeface="Arial" panose="020B0604020202020204" pitchFamily="34" charset="0"/>
                         </a:rPr>
                         <a:t>CA</a:t>
                       </a:r>
@@ -9627,7 +9859,8 @@
                           <a:schemeClr val="bg1"/>
                         </a:solidFill>
                         <a:effectLst/>
-                        <a:latin typeface="Segoe UI" panose="020B0502040204020203" pitchFamily="34" charset="0"/>
+                        <a:latin typeface="Arial" panose="020B0604020202020204" pitchFamily="34" charset="0"/>
+                        <a:cs typeface="Arial" panose="020B0604020202020204" pitchFamily="34" charset="0"/>
                       </a:endParaRPr>
                     </a:p>
                   </a:txBody>
@@ -9685,6 +9918,8 @@
                             <a:schemeClr val="bg1"/>
                           </a:solidFill>
                           <a:effectLst/>
+                          <a:latin typeface="Arial" panose="020B0604020202020204" pitchFamily="34" charset="0"/>
+                          <a:cs typeface="Arial" panose="020B0604020202020204" pitchFamily="34" charset="0"/>
                         </a:rPr>
                         <a:t>14812</a:t>
                       </a:r>
@@ -9693,7 +9928,8 @@
                           <a:schemeClr val="bg1"/>
                         </a:solidFill>
                         <a:effectLst/>
-                        <a:latin typeface="Segoe UI" panose="020B0502040204020203" pitchFamily="34" charset="0"/>
+                        <a:latin typeface="Arial" panose="020B0604020202020204" pitchFamily="34" charset="0"/>
+                        <a:cs typeface="Arial" panose="020B0604020202020204" pitchFamily="34" charset="0"/>
                       </a:endParaRPr>
                     </a:p>
                   </a:txBody>
@@ -9758,6 +9994,8 @@
                             <a:schemeClr val="bg1"/>
                           </a:solidFill>
                           <a:effectLst/>
+                          <a:latin typeface="Arial" panose="020B0604020202020204" pitchFamily="34" charset="0"/>
+                          <a:cs typeface="Arial" panose="020B0604020202020204" pitchFamily="34" charset="0"/>
                         </a:rPr>
                         <a:t>FL</a:t>
                       </a:r>
@@ -9766,7 +10004,8 @@
                           <a:schemeClr val="bg1"/>
                         </a:solidFill>
                         <a:effectLst/>
-                        <a:latin typeface="Segoe UI" panose="020B0502040204020203" pitchFamily="34" charset="0"/>
+                        <a:latin typeface="Arial" panose="020B0604020202020204" pitchFamily="34" charset="0"/>
+                        <a:cs typeface="Arial" panose="020B0604020202020204" pitchFamily="34" charset="0"/>
                       </a:endParaRPr>
                     </a:p>
                   </a:txBody>
@@ -9824,6 +10063,8 @@
                             <a:schemeClr val="bg1"/>
                           </a:solidFill>
                           <a:effectLst/>
+                          <a:latin typeface="Arial" panose="020B0604020202020204" pitchFamily="34" charset="0"/>
+                          <a:cs typeface="Arial" panose="020B0604020202020204" pitchFamily="34" charset="0"/>
                         </a:rPr>
                         <a:t>13387</a:t>
                       </a:r>
@@ -9832,7 +10073,8 @@
                           <a:schemeClr val="bg1"/>
                         </a:solidFill>
                         <a:effectLst/>
-                        <a:latin typeface="Segoe UI" panose="020B0502040204020203" pitchFamily="34" charset="0"/>
+                        <a:latin typeface="Arial" panose="020B0604020202020204" pitchFamily="34" charset="0"/>
+                        <a:cs typeface="Arial" panose="020B0604020202020204" pitchFamily="34" charset="0"/>
                       </a:endParaRPr>
                     </a:p>
                   </a:txBody>
@@ -9897,6 +10139,8 @@
                             <a:schemeClr val="bg1"/>
                           </a:solidFill>
                           <a:effectLst/>
+                          <a:latin typeface="Arial" panose="020B0604020202020204" pitchFamily="34" charset="0"/>
+                          <a:cs typeface="Arial" panose="020B0604020202020204" pitchFamily="34" charset="0"/>
                         </a:rPr>
                         <a:t>NJ</a:t>
                       </a:r>
@@ -9905,7 +10149,8 @@
                           <a:schemeClr val="bg1"/>
                         </a:solidFill>
                         <a:effectLst/>
-                        <a:latin typeface="Segoe UI" panose="020B0502040204020203" pitchFamily="34" charset="0"/>
+                        <a:latin typeface="Arial" panose="020B0604020202020204" pitchFamily="34" charset="0"/>
+                        <a:cs typeface="Arial" panose="020B0604020202020204" pitchFamily="34" charset="0"/>
                       </a:endParaRPr>
                     </a:p>
                   </a:txBody>
@@ -9963,6 +10208,8 @@
                             <a:schemeClr val="bg1"/>
                           </a:solidFill>
                           <a:effectLst/>
+                          <a:latin typeface="Arial" panose="020B0604020202020204" pitchFamily="34" charset="0"/>
+                          <a:cs typeface="Arial" panose="020B0604020202020204" pitchFamily="34" charset="0"/>
                         </a:rPr>
                         <a:t>16061</a:t>
                       </a:r>
@@ -9971,7 +10218,8 @@
                           <a:schemeClr val="bg1"/>
                         </a:solidFill>
                         <a:effectLst/>
-                        <a:latin typeface="Segoe UI" panose="020B0502040204020203" pitchFamily="34" charset="0"/>
+                        <a:latin typeface="Arial" panose="020B0604020202020204" pitchFamily="34" charset="0"/>
+                        <a:cs typeface="Arial" panose="020B0604020202020204" pitchFamily="34" charset="0"/>
                       </a:endParaRPr>
                     </a:p>
                   </a:txBody>
@@ -10036,6 +10284,8 @@
                             <a:schemeClr val="bg1"/>
                           </a:solidFill>
                           <a:effectLst/>
+                          <a:latin typeface="Arial" panose="020B0604020202020204" pitchFamily="34" charset="0"/>
+                          <a:cs typeface="Arial" panose="020B0604020202020204" pitchFamily="34" charset="0"/>
                         </a:rPr>
                         <a:t>NY</a:t>
                       </a:r>
@@ -10044,7 +10294,8 @@
                           <a:schemeClr val="bg1"/>
                         </a:solidFill>
                         <a:effectLst/>
-                        <a:latin typeface="Segoe UI" panose="020B0502040204020203" pitchFamily="34" charset="0"/>
+                        <a:latin typeface="Arial" panose="020B0604020202020204" pitchFamily="34" charset="0"/>
+                        <a:cs typeface="Arial" panose="020B0604020202020204" pitchFamily="34" charset="0"/>
                       </a:endParaRPr>
                     </a:p>
                   </a:txBody>
@@ -10102,6 +10353,8 @@
                             <a:schemeClr val="bg1"/>
                           </a:solidFill>
                           <a:effectLst/>
+                          <a:latin typeface="Arial" panose="020B0604020202020204" pitchFamily="34" charset="0"/>
+                          <a:cs typeface="Arial" panose="020B0604020202020204" pitchFamily="34" charset="0"/>
                         </a:rPr>
                         <a:t>25423</a:t>
                       </a:r>
@@ -10110,7 +10363,8 @@
                           <a:schemeClr val="bg1"/>
                         </a:solidFill>
                         <a:effectLst/>
-                        <a:latin typeface="Segoe UI" panose="020B0502040204020203" pitchFamily="34" charset="0"/>
+                        <a:latin typeface="Arial" panose="020B0604020202020204" pitchFamily="34" charset="0"/>
+                        <a:cs typeface="Arial" panose="020B0604020202020204" pitchFamily="34" charset="0"/>
                       </a:endParaRPr>
                     </a:p>
                   </a:txBody>
@@ -10175,6 +10429,8 @@
                             <a:schemeClr val="bg1"/>
                           </a:solidFill>
                           <a:effectLst/>
+                          <a:latin typeface="Arial" panose="020B0604020202020204" pitchFamily="34" charset="0"/>
+                          <a:cs typeface="Arial" panose="020B0604020202020204" pitchFamily="34" charset="0"/>
                         </a:rPr>
                         <a:t>TX</a:t>
                       </a:r>
@@ -10183,7 +10439,8 @@
                           <a:schemeClr val="bg1"/>
                         </a:solidFill>
                         <a:effectLst/>
-                        <a:latin typeface="Segoe UI" panose="020B0502040204020203" pitchFamily="34" charset="0"/>
+                        <a:latin typeface="Arial" panose="020B0604020202020204" pitchFamily="34" charset="0"/>
+                        <a:cs typeface="Arial" panose="020B0604020202020204" pitchFamily="34" charset="0"/>
                       </a:endParaRPr>
                     </a:p>
                   </a:txBody>
@@ -10241,6 +10498,8 @@
                             <a:schemeClr val="bg1"/>
                           </a:solidFill>
                           <a:effectLst/>
+                          <a:latin typeface="Arial" panose="020B0604020202020204" pitchFamily="34" charset="0"/>
+                          <a:cs typeface="Arial" panose="020B0604020202020204" pitchFamily="34" charset="0"/>
                         </a:rPr>
                         <a:t>14713</a:t>
                       </a:r>
@@ -10249,7 +10508,8 @@
                           <a:schemeClr val="bg1"/>
                         </a:solidFill>
                         <a:effectLst/>
-                        <a:latin typeface="Segoe UI" panose="020B0502040204020203" pitchFamily="34" charset="0"/>
+                        <a:latin typeface="Arial" panose="020B0604020202020204" pitchFamily="34" charset="0"/>
+                        <a:cs typeface="Arial" panose="020B0604020202020204" pitchFamily="34" charset="0"/>
                       </a:endParaRPr>
                     </a:p>
                   </a:txBody>
@@ -10305,6 +10565,36 @@
           </a:graphicData>
         </a:graphic>
       </p:graphicFrame>
+      <p:pic>
+        <p:nvPicPr>
+          <p:cNvPr id="5" name="Picture 4" descr="A screenshot of a video game&#10;&#10;Description automatically generated">
+            <a:extLst>
+              <a:ext uri="{FF2B5EF4-FFF2-40B4-BE49-F238E27FC236}">
+                <a16:creationId xmlns:a16="http://schemas.microsoft.com/office/drawing/2014/main" id="{48BF1F85-EE3F-403F-A9A2-CF61C6CF7A04}"/>
+              </a:ext>
+            </a:extLst>
+          </p:cNvPr>
+          <p:cNvPicPr>
+            <a:picLocks noChangeAspect="1"/>
+          </p:cNvPicPr>
+          <p:nvPr/>
+        </p:nvPicPr>
+        <p:blipFill>
+          <a:blip r:embed="rId3"/>
+          <a:stretch>
+            <a:fillRect/>
+          </a:stretch>
+        </p:blipFill>
+        <p:spPr>
+          <a:xfrm>
+            <a:off x="4480875" y="848962"/>
+            <a:ext cx="2743825" cy="2743825"/>
+          </a:xfrm>
+          <a:prstGeom prst="rect">
+            <a:avLst/>
+          </a:prstGeom>
+        </p:spPr>
+      </p:pic>
     </p:spTree>
     <p:extLst>
       <p:ext uri="{BB962C8B-B14F-4D97-AF65-F5344CB8AC3E}">
@@ -10362,9 +10652,12 @@
             </a:r>
             <a:r>
               <a:rPr lang="en" dirty="0"/>
-              <a:t> Infections and Deaths</a:t>
+              <a:t> Infections and </a:t>
             </a:r>
-            <a:endParaRPr lang="en-US" dirty="0"/>
+            <a:r>
+              <a:rPr lang="en-US" dirty="0"/>
+              <a:t>Mortalities</a:t>
+            </a:r>
           </a:p>
         </p:txBody>
       </p:sp>

</xml_diff>

<commit_message>
Minor changes to the presentation.  Created rough draft of writeup.
</commit_message>
<xml_diff>
--- a/Behavioral_Economic_Factors_and_COVID-19.pptx
+++ b/Behavioral_Economic_Factors_and_COVID-19.pptx
@@ -5,7 +5,7 @@
     <p:sldMasterId id="2147483660" r:id="rId1"/>
   </p:sldMasterIdLst>
   <p:notesMasterIdLst>
-    <p:notesMasterId r:id="rId19"/>
+    <p:notesMasterId r:id="rId21"/>
   </p:notesMasterIdLst>
   <p:sldIdLst>
     <p:sldId id="256" r:id="rId2"/>
@@ -24,19 +24,21 @@
     <p:sldId id="300" r:id="rId15"/>
     <p:sldId id="301" r:id="rId16"/>
     <p:sldId id="312" r:id="rId17"/>
-    <p:sldId id="293" r:id="rId18"/>
+    <p:sldId id="313" r:id="rId18"/>
+    <p:sldId id="293" r:id="rId19"/>
+    <p:sldId id="314" r:id="rId20"/>
   </p:sldIdLst>
   <p:sldSz cx="9144000" cy="5143500" type="screen16x9"/>
   <p:notesSz cx="6858000" cy="9144000"/>
   <p:embeddedFontLst>
     <p:embeddedFont>
       <p:font typeface="Abel" panose="020B0604020202020204" charset="0"/>
-      <p:regular r:id="rId20"/>
+      <p:regular r:id="rId22"/>
     </p:embeddedFont>
     <p:embeddedFont>
       <p:font typeface="Encode Sans Semi Condensed Light" panose="020B0604020202020204" charset="0"/>
-      <p:regular r:id="rId21"/>
-      <p:bold r:id="rId22"/>
+      <p:regular r:id="rId23"/>
+      <p:bold r:id="rId24"/>
     </p:embeddedFont>
   </p:embeddedFontLst>
   <p:defaultTextStyle>
@@ -921,6 +923,115 @@
     <p:extLst>
       <p:ext uri="{BB962C8B-B14F-4D97-AF65-F5344CB8AC3E}">
         <p14:creationId xmlns:p14="http://schemas.microsoft.com/office/powerpoint/2010/main" val="2399625287"/>
+      </p:ext>
+    </p:extLst>
+  </p:cSld>
+  <p:clrMapOvr>
+    <a:masterClrMapping/>
+  </p:clrMapOvr>
+</p:notes>
+</file>
+
+<file path=ppt/notesSlides/notesSlide11.xml><?xml version="1.0" encoding="utf-8"?>
+<p:notes xmlns:a="http://schemas.openxmlformats.org/drawingml/2006/main" xmlns:r="http://schemas.openxmlformats.org/officeDocument/2006/relationships" xmlns:p="http://schemas.openxmlformats.org/presentationml/2006/main" showMasterSp="0" showMasterPhAnim="0">
+  <p:cSld>
+    <p:spTree>
+      <p:nvGrpSpPr>
+        <p:cNvPr id="1" name="Shape 191"/>
+        <p:cNvGrpSpPr/>
+        <p:nvPr/>
+      </p:nvGrpSpPr>
+      <p:grpSpPr>
+        <a:xfrm>
+          <a:off x="0" y="0"/>
+          <a:ext cx="0" cy="0"/>
+          <a:chOff x="0" y="0"/>
+          <a:chExt cx="0" cy="0"/>
+        </a:xfrm>
+      </p:grpSpPr>
+      <p:sp>
+        <p:nvSpPr>
+          <p:cNvPr id="192" name="Google Shape;192;p:notes"/>
+          <p:cNvSpPr>
+            <a:spLocks noGrp="1" noRot="1" noChangeAspect="1"/>
+          </p:cNvSpPr>
+          <p:nvPr>
+            <p:ph type="sldImg" idx="2"/>
+          </p:nvPr>
+        </p:nvSpPr>
+        <p:spPr>
+          <a:xfrm>
+            <a:off x="381000" y="685800"/>
+            <a:ext cx="6096000" cy="3429000"/>
+          </a:xfrm>
+          <a:custGeom>
+            <a:avLst/>
+            <a:gdLst/>
+            <a:ahLst/>
+            <a:cxnLst/>
+            <a:rect l="l" t="t" r="r" b="b"/>
+            <a:pathLst>
+              <a:path w="120000" h="120000" extrusionOk="0">
+                <a:moveTo>
+                  <a:pt x="0" y="0"/>
+                </a:moveTo>
+                <a:lnTo>
+                  <a:pt x="120000" y="0"/>
+                </a:lnTo>
+                <a:lnTo>
+                  <a:pt x="120000" y="120000"/>
+                </a:lnTo>
+                <a:lnTo>
+                  <a:pt x="0" y="120000"/>
+                </a:lnTo>
+                <a:close/>
+              </a:path>
+            </a:pathLst>
+          </a:custGeom>
+        </p:spPr>
+      </p:sp>
+      <p:sp>
+        <p:nvSpPr>
+          <p:cNvPr id="193" name="Google Shape;193;p:notes"/>
+          <p:cNvSpPr txBox="1">
+            <a:spLocks noGrp="1"/>
+          </p:cNvSpPr>
+          <p:nvPr>
+            <p:ph type="body" idx="1"/>
+          </p:nvPr>
+        </p:nvSpPr>
+        <p:spPr>
+          <a:xfrm>
+            <a:off x="685800" y="4343400"/>
+            <a:ext cx="5486400" cy="4114800"/>
+          </a:xfrm>
+          <a:prstGeom prst="rect">
+            <a:avLst/>
+          </a:prstGeom>
+        </p:spPr>
+        <p:txBody>
+          <a:bodyPr spcFirstLastPara="1" wrap="square" lIns="91425" tIns="91425" rIns="91425" bIns="91425" anchor="t" anchorCtr="0">
+            <a:noAutofit/>
+          </a:bodyPr>
+          <a:lstStyle/>
+          <a:p>
+            <a:pPr marL="0" lvl="0" indent="0" algn="l" rtl="0">
+              <a:spcBef>
+                <a:spcPts val="0"/>
+              </a:spcBef>
+              <a:spcAft>
+                <a:spcPts val="0"/>
+              </a:spcAft>
+              <a:buNone/>
+            </a:pPr>
+            <a:endParaRPr/>
+          </a:p>
+        </p:txBody>
+      </p:sp>
+    </p:spTree>
+    <p:extLst>
+      <p:ext uri="{BB962C8B-B14F-4D97-AF65-F5344CB8AC3E}">
+        <p14:creationId xmlns:p14="http://schemas.microsoft.com/office/powerpoint/2010/main" val="2309630824"/>
       </p:ext>
     </p:extLst>
   </p:cSld>
@@ -7717,20 +7828,41 @@
           <a:p>
             <a:r>
               <a:rPr lang="en-US" sz="1600" dirty="0"/>
-              <a:t>Although we found that COVID-19 infections and COVID-19 mortality to be strongly related and predictive, economic factors such as healthcare costs and uninsured rates were linked to COVID-19 infections, but not to mortality.</a:t>
-            </a:r>
-          </a:p>
-          <a:p>
-            <a:r>
-              <a:rPr lang="en-US" sz="1600" dirty="0"/>
-              <a:t>Economic factors such as median income to be predictive of always mask use wearers.</a:t>
+              <a:t>COVID-19 infections and COVID-19 mortality to be strongly related and predictive</a:t>
             </a:r>
           </a:p>
           <a:p>
             <a:pPr lvl="1"/>
             <a:r>
               <a:rPr lang="en-US" sz="1600" dirty="0"/>
-              <a:t>High median income and high mask use are clustered in the northeast states which interestingly is the region in the country with the lowest COVID-19 infections since July 2020.</a:t>
+              <a:t>Economic factors of healthcare costs and uninsured rates were linked to COVID-19 infections only</a:t>
+            </a:r>
+          </a:p>
+          <a:p>
+            <a:pPr lvl="2"/>
+            <a:r>
+              <a:rPr lang="en-US" sz="1600" dirty="0"/>
+              <a:t>No link to mortality</a:t>
+            </a:r>
+          </a:p>
+          <a:p>
+            <a:r>
+              <a:rPr lang="en-US" sz="1600" dirty="0"/>
+              <a:t>Economic factor of median household income partly predictive of “always” mask use</a:t>
+            </a:r>
+          </a:p>
+          <a:p>
+            <a:pPr lvl="1"/>
+            <a:r>
+              <a:rPr lang="en-US" sz="1600" dirty="0"/>
+              <a:t>High median household income and “always” mask use are clustered in the northeast states</a:t>
+            </a:r>
+          </a:p>
+          <a:p>
+            <a:pPr lvl="2"/>
+            <a:r>
+              <a:rPr lang="en-US" sz="1600" dirty="0"/>
+              <a:t>Interestingly this region in the country with the lowest COVID-19 infections since survey data time.</a:t>
             </a:r>
           </a:p>
           <a:p>
@@ -7796,6 +7928,132 @@
 </file>
 
 <file path=ppt/slides/slide17.xml><?xml version="1.0" encoding="utf-8"?>
+<p:sld xmlns:a="http://schemas.openxmlformats.org/drawingml/2006/main" xmlns:r="http://schemas.openxmlformats.org/officeDocument/2006/relationships" xmlns:p="http://schemas.openxmlformats.org/presentationml/2006/main">
+  <p:cSld>
+    <p:spTree>
+      <p:nvGrpSpPr>
+        <p:cNvPr id="1" name=""/>
+        <p:cNvGrpSpPr/>
+        <p:nvPr/>
+      </p:nvGrpSpPr>
+      <p:grpSpPr>
+        <a:xfrm>
+          <a:off x="0" y="0"/>
+          <a:ext cx="0" cy="0"/>
+          <a:chOff x="0" y="0"/>
+          <a:chExt cx="0" cy="0"/>
+        </a:xfrm>
+      </p:grpSpPr>
+      <p:sp>
+        <p:nvSpPr>
+          <p:cNvPr id="2" name="Title 1">
+            <a:extLst>
+              <a:ext uri="{FF2B5EF4-FFF2-40B4-BE49-F238E27FC236}">
+                <a16:creationId xmlns:a16="http://schemas.microsoft.com/office/drawing/2014/main" id="{2E7EE3BF-5DD9-4874-841D-32E72B2EF690}"/>
+              </a:ext>
+            </a:extLst>
+          </p:cNvPr>
+          <p:cNvSpPr>
+            <a:spLocks noGrp="1"/>
+          </p:cNvSpPr>
+          <p:nvPr>
+            <p:ph type="title"/>
+          </p:nvPr>
+        </p:nvSpPr>
+        <p:spPr/>
+        <p:txBody>
+          <a:bodyPr/>
+          <a:lstStyle/>
+          <a:p>
+            <a:r>
+              <a:rPr lang="en-US" dirty="0"/>
+              <a:t>Conclusion</a:t>
+            </a:r>
+          </a:p>
+        </p:txBody>
+      </p:sp>
+      <p:sp>
+        <p:nvSpPr>
+          <p:cNvPr id="4" name="Slide Number Placeholder 3">
+            <a:extLst>
+              <a:ext uri="{FF2B5EF4-FFF2-40B4-BE49-F238E27FC236}">
+                <a16:creationId xmlns:a16="http://schemas.microsoft.com/office/drawing/2014/main" id="{CC5544F2-9051-4CE9-A080-0D9AC7C93BB7}"/>
+              </a:ext>
+            </a:extLst>
+          </p:cNvPr>
+          <p:cNvSpPr>
+            <a:spLocks noGrp="1"/>
+          </p:cNvSpPr>
+          <p:nvPr>
+            <p:ph type="sldNum" idx="12"/>
+          </p:nvPr>
+        </p:nvSpPr>
+        <p:spPr/>
+        <p:txBody>
+          <a:bodyPr/>
+          <a:lstStyle/>
+          <a:p>
+            <a:pPr marL="0" lvl="0" indent="0" algn="r" rtl="0">
+              <a:spcBef>
+                <a:spcPts val="0"/>
+              </a:spcBef>
+              <a:spcAft>
+                <a:spcPts val="0"/>
+              </a:spcAft>
+              <a:buNone/>
+            </a:pPr>
+            <a:fld id="{00000000-1234-1234-1234-123412341234}" type="slidenum">
+              <a:rPr lang="en" smtClean="0"/>
+              <a:t>17</a:t>
+            </a:fld>
+            <a:endParaRPr lang="en"/>
+          </a:p>
+        </p:txBody>
+      </p:sp>
+      <p:pic>
+        <p:nvPicPr>
+          <p:cNvPr id="8" name="Picture 7" descr="A close up of a map&#10;&#10;Description automatically generated">
+            <a:extLst>
+              <a:ext uri="{FF2B5EF4-FFF2-40B4-BE49-F238E27FC236}">
+                <a16:creationId xmlns:a16="http://schemas.microsoft.com/office/drawing/2014/main" id="{DDF8B3B9-EC5E-4BFC-9973-ECFF937FDD46}"/>
+              </a:ext>
+            </a:extLst>
+          </p:cNvPr>
+          <p:cNvPicPr>
+            <a:picLocks noChangeAspect="1"/>
+          </p:cNvPicPr>
+          <p:nvPr/>
+        </p:nvPicPr>
+        <p:blipFill>
+          <a:blip r:embed="rId2"/>
+          <a:stretch>
+            <a:fillRect/>
+          </a:stretch>
+        </p:blipFill>
+        <p:spPr>
+          <a:xfrm>
+            <a:off x="1067640" y="997084"/>
+            <a:ext cx="6005513" cy="3599309"/>
+          </a:xfrm>
+          <a:prstGeom prst="rect">
+            <a:avLst/>
+          </a:prstGeom>
+        </p:spPr>
+      </p:pic>
+    </p:spTree>
+    <p:extLst>
+      <p:ext uri="{BB962C8B-B14F-4D97-AF65-F5344CB8AC3E}">
+        <p14:creationId xmlns:p14="http://schemas.microsoft.com/office/powerpoint/2010/main" val="2361960767"/>
+      </p:ext>
+    </p:extLst>
+  </p:cSld>
+  <p:clrMapOvr>
+    <a:masterClrMapping/>
+  </p:clrMapOvr>
+</p:sld>
+</file>
+
+<file path=ppt/slides/slide18.xml><?xml version="1.0" encoding="utf-8"?>
 <p:sld xmlns:a="http://schemas.openxmlformats.org/drawingml/2006/main" xmlns:r="http://schemas.openxmlformats.org/officeDocument/2006/relationships" xmlns:p="http://schemas.openxmlformats.org/presentationml/2006/main">
   <p:cSld>
     <p:spTree>
@@ -7915,7 +8173,7 @@
           <a:p>
             <a:r>
               <a:rPr lang="en-US" sz="1400" dirty="0"/>
-              <a:t>As stated, Total All Payers Per Capita State Estimates by State of Residence - Personal Health Care (Millions of Dollars) </a:t>
+              <a:t>As stated, Center for Medicaid and Medicare Services - Total All Payers Per Capita State Estimates by State of Residence - Personal Health Care (Millions of Dollars) </a:t>
             </a:r>
           </a:p>
           <a:p>
@@ -7923,13 +8181,6 @@
             <a:r>
               <a:rPr lang="en-US" sz="1400" dirty="0"/>
               <a:t>2014 which is the last data set available</a:t>
-            </a:r>
-          </a:p>
-          <a:p>
-            <a:pPr lvl="1"/>
-            <a:r>
-              <a:rPr lang="en-US" sz="1400" dirty="0"/>
-              <a:t>Did not District of Columbia which is included in other datasets.</a:t>
             </a:r>
           </a:p>
           <a:p>
@@ -7994,7 +8245,7 @@
             </a:pPr>
             <a:fld id="{00000000-1234-1234-1234-123412341234}" type="slidenum">
               <a:rPr lang="en"/>
-              <a:t>17</a:t>
+              <a:t>18</a:t>
             </a:fld>
             <a:endParaRPr/>
           </a:p>
@@ -8004,6 +8255,120 @@
     <p:extLst>
       <p:ext uri="{BB962C8B-B14F-4D97-AF65-F5344CB8AC3E}">
         <p14:creationId xmlns:p14="http://schemas.microsoft.com/office/powerpoint/2010/main" val="1114858597"/>
+      </p:ext>
+    </p:extLst>
+  </p:cSld>
+  <p:clrMapOvr>
+    <a:masterClrMapping/>
+  </p:clrMapOvr>
+</p:sld>
+</file>
+
+<file path=ppt/slides/slide19.xml><?xml version="1.0" encoding="utf-8"?>
+<p:sld xmlns:a="http://schemas.openxmlformats.org/drawingml/2006/main" xmlns:r="http://schemas.openxmlformats.org/officeDocument/2006/relationships" xmlns:p="http://schemas.openxmlformats.org/presentationml/2006/main">
+  <p:cSld>
+    <p:spTree>
+      <p:nvGrpSpPr>
+        <p:cNvPr id="1" name="Shape 194"/>
+        <p:cNvGrpSpPr/>
+        <p:nvPr/>
+      </p:nvGrpSpPr>
+      <p:grpSpPr>
+        <a:xfrm>
+          <a:off x="0" y="0"/>
+          <a:ext cx="0" cy="0"/>
+          <a:chOff x="0" y="0"/>
+          <a:chExt cx="0" cy="0"/>
+        </a:xfrm>
+      </p:grpSpPr>
+      <p:sp>
+        <p:nvSpPr>
+          <p:cNvPr id="195" name="Google Shape;195;p19"/>
+          <p:cNvSpPr txBox="1">
+            <a:spLocks noGrp="1"/>
+          </p:cNvSpPr>
+          <p:nvPr>
+            <p:ph type="title"/>
+          </p:nvPr>
+        </p:nvSpPr>
+        <p:spPr>
+          <a:xfrm>
+            <a:off x="1385100" y="1906650"/>
+            <a:ext cx="6373800" cy="665100"/>
+          </a:xfrm>
+          <a:prstGeom prst="rect">
+            <a:avLst/>
+          </a:prstGeom>
+        </p:spPr>
+        <p:txBody>
+          <a:bodyPr spcFirstLastPara="1" wrap="square" lIns="0" tIns="0" rIns="0" bIns="0" anchor="ctr" anchorCtr="0">
+            <a:noAutofit/>
+          </a:bodyPr>
+          <a:lstStyle/>
+          <a:p>
+            <a:pPr marL="0" lvl="0" indent="0" algn="ctr" rtl="0">
+              <a:spcBef>
+                <a:spcPts val="0"/>
+              </a:spcBef>
+              <a:spcAft>
+                <a:spcPts val="0"/>
+              </a:spcAft>
+              <a:buNone/>
+            </a:pPr>
+            <a:r>
+              <a:rPr lang="en-US" dirty="0"/>
+              <a:t>Questions</a:t>
+            </a:r>
+            <a:endParaRPr dirty="0"/>
+          </a:p>
+        </p:txBody>
+      </p:sp>
+      <p:sp>
+        <p:nvSpPr>
+          <p:cNvPr id="197" name="Google Shape;197;p19"/>
+          <p:cNvSpPr txBox="1">
+            <a:spLocks noGrp="1"/>
+          </p:cNvSpPr>
+          <p:nvPr>
+            <p:ph type="sldNum" idx="12"/>
+          </p:nvPr>
+        </p:nvSpPr>
+        <p:spPr>
+          <a:xfrm>
+            <a:off x="8404384" y="4673651"/>
+            <a:ext cx="548700" cy="393600"/>
+          </a:xfrm>
+          <a:prstGeom prst="rect">
+            <a:avLst/>
+          </a:prstGeom>
+        </p:spPr>
+        <p:txBody>
+          <a:bodyPr spcFirstLastPara="1" wrap="square" lIns="0" tIns="0" rIns="0" bIns="0" anchor="ctr" anchorCtr="0">
+            <a:noAutofit/>
+          </a:bodyPr>
+          <a:lstStyle/>
+          <a:p>
+            <a:pPr marL="0" lvl="0" indent="0" algn="r" rtl="0">
+              <a:spcBef>
+                <a:spcPts val="0"/>
+              </a:spcBef>
+              <a:spcAft>
+                <a:spcPts val="0"/>
+              </a:spcAft>
+              <a:buNone/>
+            </a:pPr>
+            <a:fld id="{00000000-1234-1234-1234-123412341234}" type="slidenum">
+              <a:rPr lang="en"/>
+              <a:t>19</a:t>
+            </a:fld>
+            <a:endParaRPr/>
+          </a:p>
+        </p:txBody>
+      </p:sp>
+    </p:spTree>
+    <p:extLst>
+      <p:ext uri="{BB962C8B-B14F-4D97-AF65-F5344CB8AC3E}">
+        <p14:creationId xmlns:p14="http://schemas.microsoft.com/office/powerpoint/2010/main" val="3201313874"/>
       </p:ext>
     </p:extLst>
   </p:cSld>
@@ -8092,7 +8457,7 @@
           <a:p>
             <a:r>
               <a:rPr lang="en-US" sz="1200" dirty="0"/>
-              <a:t>Questions:</a:t>
+              <a:t>Analysis:</a:t>
             </a:r>
           </a:p>
           <a:p>

</xml_diff>